<commit_message>
feat: view index.html navbar and first event bar changed
</commit_message>
<xml_diff>
--- a/hi/view powerpoint.pptx
+++ b/hi/view powerpoint.pptx
@@ -214,7 +214,7 @@
           <a:p>
             <a:fld id="{D2AEBC38-2F16-4FAE-ADF6-419CDA398339}" type="datetimeFigureOut">
               <a:rPr lang="ko-KR" altLang="en-US" smtClean="0"/>
-              <a:t>2022-09-27</a:t>
+              <a:t>2022-09-28</a:t>
             </a:fld>
             <a:endParaRPr lang="ko-KR" altLang="en-US"/>
           </a:p>
@@ -781,7 +781,7 @@
           <a:p>
             <a:fld id="{E37795E4-A1DC-4025-8E01-34B9FDF0EAC2}" type="datetimeFigureOut">
               <a:rPr lang="ko-KR" altLang="en-US" smtClean="0"/>
-              <a:t>2022-09-27</a:t>
+              <a:t>2022-09-28</a:t>
             </a:fld>
             <a:endParaRPr lang="ko-KR" altLang="en-US"/>
           </a:p>
@@ -951,7 +951,7 @@
           <a:p>
             <a:fld id="{E37795E4-A1DC-4025-8E01-34B9FDF0EAC2}" type="datetimeFigureOut">
               <a:rPr lang="ko-KR" altLang="en-US" smtClean="0"/>
-              <a:t>2022-09-27</a:t>
+              <a:t>2022-09-28</a:t>
             </a:fld>
             <a:endParaRPr lang="ko-KR" altLang="en-US"/>
           </a:p>
@@ -1131,7 +1131,7 @@
           <a:p>
             <a:fld id="{E37795E4-A1DC-4025-8E01-34B9FDF0EAC2}" type="datetimeFigureOut">
               <a:rPr lang="ko-KR" altLang="en-US" smtClean="0"/>
-              <a:t>2022-09-27</a:t>
+              <a:t>2022-09-28</a:t>
             </a:fld>
             <a:endParaRPr lang="ko-KR" altLang="en-US"/>
           </a:p>
@@ -1301,7 +1301,7 @@
           <a:p>
             <a:fld id="{E37795E4-A1DC-4025-8E01-34B9FDF0EAC2}" type="datetimeFigureOut">
               <a:rPr lang="ko-KR" altLang="en-US" smtClean="0"/>
-              <a:t>2022-09-27</a:t>
+              <a:t>2022-09-28</a:t>
             </a:fld>
             <a:endParaRPr lang="ko-KR" altLang="en-US"/>
           </a:p>
@@ -1547,7 +1547,7 @@
           <a:p>
             <a:fld id="{E37795E4-A1DC-4025-8E01-34B9FDF0EAC2}" type="datetimeFigureOut">
               <a:rPr lang="ko-KR" altLang="en-US" smtClean="0"/>
-              <a:t>2022-09-27</a:t>
+              <a:t>2022-09-28</a:t>
             </a:fld>
             <a:endParaRPr lang="ko-KR" altLang="en-US"/>
           </a:p>
@@ -1779,7 +1779,7 @@
           <a:p>
             <a:fld id="{E37795E4-A1DC-4025-8E01-34B9FDF0EAC2}" type="datetimeFigureOut">
               <a:rPr lang="ko-KR" altLang="en-US" smtClean="0"/>
-              <a:t>2022-09-27</a:t>
+              <a:t>2022-09-28</a:t>
             </a:fld>
             <a:endParaRPr lang="ko-KR" altLang="en-US"/>
           </a:p>
@@ -2146,7 +2146,7 @@
           <a:p>
             <a:fld id="{E37795E4-A1DC-4025-8E01-34B9FDF0EAC2}" type="datetimeFigureOut">
               <a:rPr lang="ko-KR" altLang="en-US" smtClean="0"/>
-              <a:t>2022-09-27</a:t>
+              <a:t>2022-09-28</a:t>
             </a:fld>
             <a:endParaRPr lang="ko-KR" altLang="en-US"/>
           </a:p>
@@ -2264,7 +2264,7 @@
           <a:p>
             <a:fld id="{E37795E4-A1DC-4025-8E01-34B9FDF0EAC2}" type="datetimeFigureOut">
               <a:rPr lang="ko-KR" altLang="en-US" smtClean="0"/>
-              <a:t>2022-09-27</a:t>
+              <a:t>2022-09-28</a:t>
             </a:fld>
             <a:endParaRPr lang="ko-KR" altLang="en-US"/>
           </a:p>
@@ -2359,7 +2359,7 @@
           <a:p>
             <a:fld id="{E37795E4-A1DC-4025-8E01-34B9FDF0EAC2}" type="datetimeFigureOut">
               <a:rPr lang="ko-KR" altLang="en-US" smtClean="0"/>
-              <a:t>2022-09-27</a:t>
+              <a:t>2022-09-28</a:t>
             </a:fld>
             <a:endParaRPr lang="ko-KR" altLang="en-US"/>
           </a:p>
@@ -2636,7 +2636,7 @@
           <a:p>
             <a:fld id="{E37795E4-A1DC-4025-8E01-34B9FDF0EAC2}" type="datetimeFigureOut">
               <a:rPr lang="ko-KR" altLang="en-US" smtClean="0"/>
-              <a:t>2022-09-27</a:t>
+              <a:t>2022-09-28</a:t>
             </a:fld>
             <a:endParaRPr lang="ko-KR" altLang="en-US"/>
           </a:p>
@@ -2889,7 +2889,7 @@
           <a:p>
             <a:fld id="{E37795E4-A1DC-4025-8E01-34B9FDF0EAC2}" type="datetimeFigureOut">
               <a:rPr lang="ko-KR" altLang="en-US" smtClean="0"/>
-              <a:t>2022-09-27</a:t>
+              <a:t>2022-09-28</a:t>
             </a:fld>
             <a:endParaRPr lang="ko-KR" altLang="en-US"/>
           </a:p>
@@ -3102,7 +3102,7 @@
           <a:p>
             <a:fld id="{E37795E4-A1DC-4025-8E01-34B9FDF0EAC2}" type="datetimeFigureOut">
               <a:rPr lang="ko-KR" altLang="en-US" smtClean="0"/>
-              <a:t>2022-09-27</a:t>
+              <a:t>2022-09-28</a:t>
             </a:fld>
             <a:endParaRPr lang="ko-KR" altLang="en-US"/>
           </a:p>

</xml_diff>

<commit_message>
I try div vectical align but failed. i want to next try;
</commit_message>
<xml_diff>
--- a/hi/view powerpoint.pptx
+++ b/hi/view powerpoint.pptx
@@ -214,7 +214,7 @@
           <a:p>
             <a:fld id="{D2AEBC38-2F16-4FAE-ADF6-419CDA398339}" type="datetimeFigureOut">
               <a:rPr lang="ko-KR" altLang="en-US" smtClean="0"/>
-              <a:t>2022-10-01</a:t>
+              <a:t>2022-10-04</a:t>
             </a:fld>
             <a:endParaRPr lang="ko-KR" altLang="en-US"/>
           </a:p>
@@ -778,7 +778,7 @@
           <a:p>
             <a:fld id="{E37795E4-A1DC-4025-8E01-34B9FDF0EAC2}" type="datetimeFigureOut">
               <a:rPr lang="ko-KR" altLang="en-US" smtClean="0"/>
-              <a:t>2022-10-01</a:t>
+              <a:t>2022-10-04</a:t>
             </a:fld>
             <a:endParaRPr lang="ko-KR" altLang="en-US"/>
           </a:p>
@@ -946,7 +946,7 @@
           <a:p>
             <a:fld id="{E37795E4-A1DC-4025-8E01-34B9FDF0EAC2}" type="datetimeFigureOut">
               <a:rPr lang="ko-KR" altLang="en-US" smtClean="0"/>
-              <a:t>2022-10-01</a:t>
+              <a:t>2022-10-04</a:t>
             </a:fld>
             <a:endParaRPr lang="ko-KR" altLang="en-US"/>
           </a:p>
@@ -1124,7 +1124,7 @@
           <a:p>
             <a:fld id="{E37795E4-A1DC-4025-8E01-34B9FDF0EAC2}" type="datetimeFigureOut">
               <a:rPr lang="ko-KR" altLang="en-US" smtClean="0"/>
-              <a:t>2022-10-01</a:t>
+              <a:t>2022-10-04</a:t>
             </a:fld>
             <a:endParaRPr lang="ko-KR" altLang="en-US"/>
           </a:p>
@@ -1292,7 +1292,7 @@
           <a:p>
             <a:fld id="{E37795E4-A1DC-4025-8E01-34B9FDF0EAC2}" type="datetimeFigureOut">
               <a:rPr lang="ko-KR" altLang="en-US" smtClean="0"/>
-              <a:t>2022-10-01</a:t>
+              <a:t>2022-10-04</a:t>
             </a:fld>
             <a:endParaRPr lang="ko-KR" altLang="en-US"/>
           </a:p>
@@ -1537,7 +1537,7 @@
           <a:p>
             <a:fld id="{E37795E4-A1DC-4025-8E01-34B9FDF0EAC2}" type="datetimeFigureOut">
               <a:rPr lang="ko-KR" altLang="en-US" smtClean="0"/>
-              <a:t>2022-10-01</a:t>
+              <a:t>2022-10-04</a:t>
             </a:fld>
             <a:endParaRPr lang="ko-KR" altLang="en-US"/>
           </a:p>
@@ -1766,7 +1766,7 @@
           <a:p>
             <a:fld id="{E37795E4-A1DC-4025-8E01-34B9FDF0EAC2}" type="datetimeFigureOut">
               <a:rPr lang="ko-KR" altLang="en-US" smtClean="0"/>
-              <a:t>2022-10-01</a:t>
+              <a:t>2022-10-04</a:t>
             </a:fld>
             <a:endParaRPr lang="ko-KR" altLang="en-US"/>
           </a:p>
@@ -2130,7 +2130,7 @@
           <a:p>
             <a:fld id="{E37795E4-A1DC-4025-8E01-34B9FDF0EAC2}" type="datetimeFigureOut">
               <a:rPr lang="ko-KR" altLang="en-US" smtClean="0"/>
-              <a:t>2022-10-01</a:t>
+              <a:t>2022-10-04</a:t>
             </a:fld>
             <a:endParaRPr lang="ko-KR" altLang="en-US"/>
           </a:p>
@@ -2247,7 +2247,7 @@
           <a:p>
             <a:fld id="{E37795E4-A1DC-4025-8E01-34B9FDF0EAC2}" type="datetimeFigureOut">
               <a:rPr lang="ko-KR" altLang="en-US" smtClean="0"/>
-              <a:t>2022-10-01</a:t>
+              <a:t>2022-10-04</a:t>
             </a:fld>
             <a:endParaRPr lang="ko-KR" altLang="en-US"/>
           </a:p>
@@ -2342,7 +2342,7 @@
           <a:p>
             <a:fld id="{E37795E4-A1DC-4025-8E01-34B9FDF0EAC2}" type="datetimeFigureOut">
               <a:rPr lang="ko-KR" altLang="en-US" smtClean="0"/>
-              <a:t>2022-10-01</a:t>
+              <a:t>2022-10-04</a:t>
             </a:fld>
             <a:endParaRPr lang="ko-KR" altLang="en-US"/>
           </a:p>
@@ -2617,7 +2617,7 @@
           <a:p>
             <a:fld id="{E37795E4-A1DC-4025-8E01-34B9FDF0EAC2}" type="datetimeFigureOut">
               <a:rPr lang="ko-KR" altLang="en-US" smtClean="0"/>
-              <a:t>2022-10-01</a:t>
+              <a:t>2022-10-04</a:t>
             </a:fld>
             <a:endParaRPr lang="ko-KR" altLang="en-US"/>
           </a:p>
@@ -2869,7 +2869,7 @@
           <a:p>
             <a:fld id="{E37795E4-A1DC-4025-8E01-34B9FDF0EAC2}" type="datetimeFigureOut">
               <a:rPr lang="ko-KR" altLang="en-US" smtClean="0"/>
-              <a:t>2022-10-01</a:t>
+              <a:t>2022-10-04</a:t>
             </a:fld>
             <a:endParaRPr lang="ko-KR" altLang="en-US"/>
           </a:p>
@@ -3080,7 +3080,7 @@
           <a:p>
             <a:fld id="{E37795E4-A1DC-4025-8E01-34B9FDF0EAC2}" type="datetimeFigureOut">
               <a:rPr lang="ko-KR" altLang="en-US" smtClean="0"/>
-              <a:t>2022-10-01</a:t>
+              <a:t>2022-10-04</a:t>
             </a:fld>
             <a:endParaRPr lang="ko-KR" altLang="en-US"/>
           </a:p>
@@ -4794,9 +4794,10 @@
           <a:lstStyle/>
           <a:p>
             <a:r>
-              <a:rPr lang="ko-KR" altLang="en-US" dirty="0"/>
-              <a:t>상품 가격</a:t>
-            </a:r>
+              <a:rPr lang="ko-KR" altLang="en-US" dirty="0" smtClean="0"/>
+              <a:t>회원 리뷰 제품 수</a:t>
+            </a:r>
+            <a:endParaRPr lang="ko-KR" altLang="en-US" dirty="0"/>
           </a:p>
         </p:txBody>
       </p:sp>
@@ -4825,9 +4826,10 @@
           <a:lstStyle/>
           <a:p>
             <a:r>
-              <a:rPr lang="ko-KR" altLang="en-US" dirty="0"/>
-              <a:t>상품 정보</a:t>
-            </a:r>
+              <a:rPr lang="ko-KR" altLang="en-US" dirty="0" smtClean="0"/>
+              <a:t>회원이 선호하는 성별</a:t>
+            </a:r>
+            <a:endParaRPr lang="ko-KR" altLang="en-US" dirty="0"/>
           </a:p>
         </p:txBody>
       </p:sp>

</xml_diff>

<commit_message>
cs counseling management page
</commit_message>
<xml_diff>
--- a/hi/view powerpoint.pptx
+++ b/hi/view powerpoint.pptx
@@ -5,7 +5,7 @@
     <p:sldMasterId id="2147483648" r:id="rId1"/>
   </p:sldMasterIdLst>
   <p:notesMasterIdLst>
-    <p:notesMasterId r:id="rId20"/>
+    <p:notesMasterId r:id="rId21"/>
   </p:notesMasterIdLst>
   <p:sldIdLst>
     <p:sldId id="256" r:id="rId2"/>
@@ -26,6 +26,7 @@
     <p:sldId id="271" r:id="rId17"/>
     <p:sldId id="272" r:id="rId18"/>
     <p:sldId id="273" r:id="rId19"/>
+    <p:sldId id="274" r:id="rId20"/>
   </p:sldIdLst>
   <p:sldSz cx="12192000" cy="6858000"/>
   <p:notesSz cx="6858000" cy="9144000"/>
@@ -214,7 +215,7 @@
           <a:p>
             <a:fld id="{D2AEBC38-2F16-4FAE-ADF6-419CDA398339}" type="datetimeFigureOut">
               <a:rPr lang="ko-KR" altLang="en-US" smtClean="0"/>
-              <a:t>2022-10-04</a:t>
+              <a:t>2022-10-05</a:t>
             </a:fld>
             <a:endParaRPr lang="ko-KR" altLang="en-US"/>
           </a:p>
@@ -778,7 +779,7 @@
           <a:p>
             <a:fld id="{E37795E4-A1DC-4025-8E01-34B9FDF0EAC2}" type="datetimeFigureOut">
               <a:rPr lang="ko-KR" altLang="en-US" smtClean="0"/>
-              <a:t>2022-10-04</a:t>
+              <a:t>2022-10-05</a:t>
             </a:fld>
             <a:endParaRPr lang="ko-KR" altLang="en-US"/>
           </a:p>
@@ -946,7 +947,7 @@
           <a:p>
             <a:fld id="{E37795E4-A1DC-4025-8E01-34B9FDF0EAC2}" type="datetimeFigureOut">
               <a:rPr lang="ko-KR" altLang="en-US" smtClean="0"/>
-              <a:t>2022-10-04</a:t>
+              <a:t>2022-10-05</a:t>
             </a:fld>
             <a:endParaRPr lang="ko-KR" altLang="en-US"/>
           </a:p>
@@ -1124,7 +1125,7 @@
           <a:p>
             <a:fld id="{E37795E4-A1DC-4025-8E01-34B9FDF0EAC2}" type="datetimeFigureOut">
               <a:rPr lang="ko-KR" altLang="en-US" smtClean="0"/>
-              <a:t>2022-10-04</a:t>
+              <a:t>2022-10-05</a:t>
             </a:fld>
             <a:endParaRPr lang="ko-KR" altLang="en-US"/>
           </a:p>
@@ -1292,7 +1293,7 @@
           <a:p>
             <a:fld id="{E37795E4-A1DC-4025-8E01-34B9FDF0EAC2}" type="datetimeFigureOut">
               <a:rPr lang="ko-KR" altLang="en-US" smtClean="0"/>
-              <a:t>2022-10-04</a:t>
+              <a:t>2022-10-05</a:t>
             </a:fld>
             <a:endParaRPr lang="ko-KR" altLang="en-US"/>
           </a:p>
@@ -1537,7 +1538,7 @@
           <a:p>
             <a:fld id="{E37795E4-A1DC-4025-8E01-34B9FDF0EAC2}" type="datetimeFigureOut">
               <a:rPr lang="ko-KR" altLang="en-US" smtClean="0"/>
-              <a:t>2022-10-04</a:t>
+              <a:t>2022-10-05</a:t>
             </a:fld>
             <a:endParaRPr lang="ko-KR" altLang="en-US"/>
           </a:p>
@@ -1766,7 +1767,7 @@
           <a:p>
             <a:fld id="{E37795E4-A1DC-4025-8E01-34B9FDF0EAC2}" type="datetimeFigureOut">
               <a:rPr lang="ko-KR" altLang="en-US" smtClean="0"/>
-              <a:t>2022-10-04</a:t>
+              <a:t>2022-10-05</a:t>
             </a:fld>
             <a:endParaRPr lang="ko-KR" altLang="en-US"/>
           </a:p>
@@ -2130,7 +2131,7 @@
           <a:p>
             <a:fld id="{E37795E4-A1DC-4025-8E01-34B9FDF0EAC2}" type="datetimeFigureOut">
               <a:rPr lang="ko-KR" altLang="en-US" smtClean="0"/>
-              <a:t>2022-10-04</a:t>
+              <a:t>2022-10-05</a:t>
             </a:fld>
             <a:endParaRPr lang="ko-KR" altLang="en-US"/>
           </a:p>
@@ -2247,7 +2248,7 @@
           <a:p>
             <a:fld id="{E37795E4-A1DC-4025-8E01-34B9FDF0EAC2}" type="datetimeFigureOut">
               <a:rPr lang="ko-KR" altLang="en-US" smtClean="0"/>
-              <a:t>2022-10-04</a:t>
+              <a:t>2022-10-05</a:t>
             </a:fld>
             <a:endParaRPr lang="ko-KR" altLang="en-US"/>
           </a:p>
@@ -2342,7 +2343,7 @@
           <a:p>
             <a:fld id="{E37795E4-A1DC-4025-8E01-34B9FDF0EAC2}" type="datetimeFigureOut">
               <a:rPr lang="ko-KR" altLang="en-US" smtClean="0"/>
-              <a:t>2022-10-04</a:t>
+              <a:t>2022-10-05</a:t>
             </a:fld>
             <a:endParaRPr lang="ko-KR" altLang="en-US"/>
           </a:p>
@@ -2617,7 +2618,7 @@
           <a:p>
             <a:fld id="{E37795E4-A1DC-4025-8E01-34B9FDF0EAC2}" type="datetimeFigureOut">
               <a:rPr lang="ko-KR" altLang="en-US" smtClean="0"/>
-              <a:t>2022-10-04</a:t>
+              <a:t>2022-10-05</a:t>
             </a:fld>
             <a:endParaRPr lang="ko-KR" altLang="en-US"/>
           </a:p>
@@ -2869,7 +2870,7 @@
           <a:p>
             <a:fld id="{E37795E4-A1DC-4025-8E01-34B9FDF0EAC2}" type="datetimeFigureOut">
               <a:rPr lang="ko-KR" altLang="en-US" smtClean="0"/>
-              <a:t>2022-10-04</a:t>
+              <a:t>2022-10-05</a:t>
             </a:fld>
             <a:endParaRPr lang="ko-KR" altLang="en-US"/>
           </a:p>
@@ -3080,7 +3081,7 @@
           <a:p>
             <a:fld id="{E37795E4-A1DC-4025-8E01-34B9FDF0EAC2}" type="datetimeFigureOut">
               <a:rPr lang="ko-KR" altLang="en-US" smtClean="0"/>
-              <a:t>2022-10-04</a:t>
+              <a:t>2022-10-05</a:t>
             </a:fld>
             <a:endParaRPr lang="ko-KR" altLang="en-US"/>
           </a:p>
@@ -7170,12 +7171,12 @@
           <a:p>
             <a:pPr algn="ctr"/>
             <a:r>
-              <a:rPr lang="en-US" altLang="ko-KR" dirty="0">
-                <a:solidFill>
-                  <a:sysClr val="windowText" lastClr="000000"/>
-                </a:solidFill>
-              </a:rPr>
-              <a:t>CS View</a:t>
+              <a:rPr lang="en-US" altLang="ko-KR" dirty="0" smtClean="0">
+                <a:solidFill>
+                  <a:sysClr val="windowText" lastClr="000000"/>
+                </a:solidFill>
+              </a:rPr>
+              <a:t>Request Title</a:t>
             </a:r>
             <a:endParaRPr lang="ko-KR" altLang="en-US" dirty="0">
               <a:solidFill>
@@ -7452,6 +7453,446 @@
     <p:extLst>
       <p:ext uri="{BB962C8B-B14F-4D97-AF65-F5344CB8AC3E}">
         <p14:creationId xmlns:p14="http://schemas.microsoft.com/office/powerpoint/2010/main" val="647287143"/>
+      </p:ext>
+    </p:extLst>
+  </p:cSld>
+  <p:clrMapOvr>
+    <a:masterClrMapping/>
+  </p:clrMapOvr>
+</p:sld>
+</file>
+
+<file path=ppt/slides/slide19.xml><?xml version="1.0" encoding="utf-8"?>
+<p:sld xmlns:a="http://schemas.openxmlformats.org/drawingml/2006/main" xmlns:r="http://schemas.openxmlformats.org/officeDocument/2006/relationships" xmlns:p="http://schemas.openxmlformats.org/presentationml/2006/main">
+  <p:cSld>
+    <p:spTree>
+      <p:nvGrpSpPr>
+        <p:cNvPr id="1" name=""/>
+        <p:cNvGrpSpPr/>
+        <p:nvPr/>
+      </p:nvGrpSpPr>
+      <p:grpSpPr>
+        <a:xfrm>
+          <a:off x="0" y="0"/>
+          <a:ext cx="0" cy="0"/>
+          <a:chOff x="0" y="0"/>
+          <a:chExt cx="0" cy="0"/>
+        </a:xfrm>
+      </p:grpSpPr>
+      <p:sp>
+        <p:nvSpPr>
+          <p:cNvPr id="2" name="직사각형 1"/>
+          <p:cNvSpPr/>
+          <p:nvPr/>
+        </p:nvSpPr>
+        <p:spPr>
+          <a:xfrm>
+            <a:off x="1149530" y="0"/>
+            <a:ext cx="9575077" cy="6858000"/>
+          </a:xfrm>
+          <a:prstGeom prst="rect">
+            <a:avLst/>
+          </a:prstGeom>
+          <a:solidFill>
+            <a:srgbClr val="FFB9C6"/>
+          </a:solidFill>
+          <a:ln>
+            <a:noFill/>
+          </a:ln>
+        </p:spPr>
+        <p:style>
+          <a:lnRef idx="2">
+            <a:schemeClr val="accent1">
+              <a:shade val="50000"/>
+            </a:schemeClr>
+          </a:lnRef>
+          <a:fillRef idx="1">
+            <a:schemeClr val="accent1"/>
+          </a:fillRef>
+          <a:effectRef idx="0">
+            <a:schemeClr val="accent1"/>
+          </a:effectRef>
+          <a:fontRef idx="minor">
+            <a:schemeClr val="lt1"/>
+          </a:fontRef>
+        </p:style>
+        <p:txBody>
+          <a:bodyPr rtlCol="0" anchor="ctr"/>
+          <a:lstStyle/>
+          <a:p>
+            <a:pPr algn="ctr"/>
+            <a:endParaRPr lang="ko-KR" altLang="en-US"/>
+          </a:p>
+        </p:txBody>
+      </p:sp>
+      <p:sp>
+        <p:nvSpPr>
+          <p:cNvPr id="3" name="직사각형 2"/>
+          <p:cNvSpPr/>
+          <p:nvPr/>
+        </p:nvSpPr>
+        <p:spPr>
+          <a:xfrm>
+            <a:off x="2664823" y="444137"/>
+            <a:ext cx="6217920" cy="822960"/>
+          </a:xfrm>
+          <a:prstGeom prst="rect">
+            <a:avLst/>
+          </a:prstGeom>
+        </p:spPr>
+        <p:style>
+          <a:lnRef idx="2">
+            <a:schemeClr val="accent1">
+              <a:shade val="50000"/>
+            </a:schemeClr>
+          </a:lnRef>
+          <a:fillRef idx="1">
+            <a:schemeClr val="accent1"/>
+          </a:fillRef>
+          <a:effectRef idx="0">
+            <a:schemeClr val="accent1"/>
+          </a:effectRef>
+          <a:fontRef idx="minor">
+            <a:schemeClr val="lt1"/>
+          </a:fontRef>
+        </p:style>
+        <p:txBody>
+          <a:bodyPr rtlCol="0" anchor="ctr"/>
+          <a:lstStyle/>
+          <a:p>
+            <a:pPr algn="ctr"/>
+            <a:r>
+              <a:rPr lang="en-US" altLang="ko-KR" smtClean="0"/>
+              <a:t>CS Request Management</a:t>
+            </a:r>
+            <a:endParaRPr lang="ko-KR" altLang="en-US" dirty="0"/>
+          </a:p>
+        </p:txBody>
+      </p:sp>
+      <p:sp>
+        <p:nvSpPr>
+          <p:cNvPr id="4" name="직사각형 3"/>
+          <p:cNvSpPr/>
+          <p:nvPr/>
+        </p:nvSpPr>
+        <p:spPr>
+          <a:xfrm>
+            <a:off x="2625634" y="2011680"/>
+            <a:ext cx="6230983" cy="574766"/>
+          </a:xfrm>
+          <a:prstGeom prst="rect">
+            <a:avLst/>
+          </a:prstGeom>
+        </p:spPr>
+        <p:style>
+          <a:lnRef idx="2">
+            <a:schemeClr val="accent1">
+              <a:shade val="50000"/>
+            </a:schemeClr>
+          </a:lnRef>
+          <a:fillRef idx="1">
+            <a:schemeClr val="accent1"/>
+          </a:fillRef>
+          <a:effectRef idx="0">
+            <a:schemeClr val="accent1"/>
+          </a:effectRef>
+          <a:fontRef idx="minor">
+            <a:schemeClr val="lt1"/>
+          </a:fontRef>
+        </p:style>
+        <p:txBody>
+          <a:bodyPr rtlCol="0" anchor="ctr"/>
+          <a:lstStyle/>
+          <a:p>
+            <a:pPr algn="ctr"/>
+            <a:endParaRPr lang="ko-KR" altLang="en-US"/>
+          </a:p>
+        </p:txBody>
+      </p:sp>
+      <p:sp>
+        <p:nvSpPr>
+          <p:cNvPr id="15" name="직사각형 14"/>
+          <p:cNvSpPr/>
+          <p:nvPr/>
+        </p:nvSpPr>
+        <p:spPr>
+          <a:xfrm>
+            <a:off x="2625634" y="2586446"/>
+            <a:ext cx="6230983" cy="574766"/>
+          </a:xfrm>
+          <a:prstGeom prst="rect">
+            <a:avLst/>
+          </a:prstGeom>
+        </p:spPr>
+        <p:style>
+          <a:lnRef idx="2">
+            <a:schemeClr val="accent1">
+              <a:shade val="50000"/>
+            </a:schemeClr>
+          </a:lnRef>
+          <a:fillRef idx="1">
+            <a:schemeClr val="accent1"/>
+          </a:fillRef>
+          <a:effectRef idx="0">
+            <a:schemeClr val="accent1"/>
+          </a:effectRef>
+          <a:fontRef idx="minor">
+            <a:schemeClr val="lt1"/>
+          </a:fontRef>
+        </p:style>
+        <p:txBody>
+          <a:bodyPr rtlCol="0" anchor="ctr"/>
+          <a:lstStyle/>
+          <a:p>
+            <a:pPr algn="ctr"/>
+            <a:endParaRPr lang="ko-KR" altLang="en-US"/>
+          </a:p>
+        </p:txBody>
+      </p:sp>
+      <p:sp>
+        <p:nvSpPr>
+          <p:cNvPr id="16" name="직사각형 15"/>
+          <p:cNvSpPr/>
+          <p:nvPr/>
+        </p:nvSpPr>
+        <p:spPr>
+          <a:xfrm>
+            <a:off x="2625634" y="3174274"/>
+            <a:ext cx="6230983" cy="574766"/>
+          </a:xfrm>
+          <a:prstGeom prst="rect">
+            <a:avLst/>
+          </a:prstGeom>
+        </p:spPr>
+        <p:style>
+          <a:lnRef idx="2">
+            <a:schemeClr val="accent1">
+              <a:shade val="50000"/>
+            </a:schemeClr>
+          </a:lnRef>
+          <a:fillRef idx="1">
+            <a:schemeClr val="accent1"/>
+          </a:fillRef>
+          <a:effectRef idx="0">
+            <a:schemeClr val="accent1"/>
+          </a:effectRef>
+          <a:fontRef idx="minor">
+            <a:schemeClr val="lt1"/>
+          </a:fontRef>
+        </p:style>
+        <p:txBody>
+          <a:bodyPr rtlCol="0" anchor="ctr"/>
+          <a:lstStyle/>
+          <a:p>
+            <a:pPr algn="ctr"/>
+            <a:endParaRPr lang="ko-KR" altLang="en-US"/>
+          </a:p>
+        </p:txBody>
+      </p:sp>
+      <p:sp>
+        <p:nvSpPr>
+          <p:cNvPr id="17" name="직사각형 16"/>
+          <p:cNvSpPr/>
+          <p:nvPr/>
+        </p:nvSpPr>
+        <p:spPr>
+          <a:xfrm>
+            <a:off x="2625634" y="3735978"/>
+            <a:ext cx="6230983" cy="574766"/>
+          </a:xfrm>
+          <a:prstGeom prst="rect">
+            <a:avLst/>
+          </a:prstGeom>
+        </p:spPr>
+        <p:style>
+          <a:lnRef idx="2">
+            <a:schemeClr val="accent1">
+              <a:shade val="50000"/>
+            </a:schemeClr>
+          </a:lnRef>
+          <a:fillRef idx="1">
+            <a:schemeClr val="accent1"/>
+          </a:fillRef>
+          <a:effectRef idx="0">
+            <a:schemeClr val="accent1"/>
+          </a:effectRef>
+          <a:fontRef idx="minor">
+            <a:schemeClr val="lt1"/>
+          </a:fontRef>
+        </p:style>
+        <p:txBody>
+          <a:bodyPr rtlCol="0" anchor="ctr"/>
+          <a:lstStyle/>
+          <a:p>
+            <a:pPr algn="ctr"/>
+            <a:endParaRPr lang="ko-KR" altLang="en-US"/>
+          </a:p>
+        </p:txBody>
+      </p:sp>
+      <p:sp>
+        <p:nvSpPr>
+          <p:cNvPr id="18" name="직사각형 17"/>
+          <p:cNvSpPr/>
+          <p:nvPr/>
+        </p:nvSpPr>
+        <p:spPr>
+          <a:xfrm>
+            <a:off x="2625634" y="4310744"/>
+            <a:ext cx="6230983" cy="574766"/>
+          </a:xfrm>
+          <a:prstGeom prst="rect">
+            <a:avLst/>
+          </a:prstGeom>
+        </p:spPr>
+        <p:style>
+          <a:lnRef idx="2">
+            <a:schemeClr val="accent1">
+              <a:shade val="50000"/>
+            </a:schemeClr>
+          </a:lnRef>
+          <a:fillRef idx="1">
+            <a:schemeClr val="accent1"/>
+          </a:fillRef>
+          <a:effectRef idx="0">
+            <a:schemeClr val="accent1"/>
+          </a:effectRef>
+          <a:fontRef idx="minor">
+            <a:schemeClr val="lt1"/>
+          </a:fontRef>
+        </p:style>
+        <p:txBody>
+          <a:bodyPr rtlCol="0" anchor="ctr"/>
+          <a:lstStyle/>
+          <a:p>
+            <a:pPr algn="ctr"/>
+            <a:endParaRPr lang="ko-KR" altLang="en-US"/>
+          </a:p>
+        </p:txBody>
+      </p:sp>
+      <p:sp>
+        <p:nvSpPr>
+          <p:cNvPr id="19" name="직사각형 18"/>
+          <p:cNvSpPr/>
+          <p:nvPr/>
+        </p:nvSpPr>
+        <p:spPr>
+          <a:xfrm>
+            <a:off x="2625634" y="4885510"/>
+            <a:ext cx="6230983" cy="574766"/>
+          </a:xfrm>
+          <a:prstGeom prst="rect">
+            <a:avLst/>
+          </a:prstGeom>
+        </p:spPr>
+        <p:style>
+          <a:lnRef idx="2">
+            <a:schemeClr val="accent1">
+              <a:shade val="50000"/>
+            </a:schemeClr>
+          </a:lnRef>
+          <a:fillRef idx="1">
+            <a:schemeClr val="accent1"/>
+          </a:fillRef>
+          <a:effectRef idx="0">
+            <a:schemeClr val="accent1"/>
+          </a:effectRef>
+          <a:fontRef idx="minor">
+            <a:schemeClr val="lt1"/>
+          </a:fontRef>
+        </p:style>
+        <p:txBody>
+          <a:bodyPr rtlCol="0" anchor="ctr"/>
+          <a:lstStyle/>
+          <a:p>
+            <a:pPr algn="ctr"/>
+            <a:endParaRPr lang="ko-KR" altLang="en-US"/>
+          </a:p>
+        </p:txBody>
+      </p:sp>
+      <p:sp>
+        <p:nvSpPr>
+          <p:cNvPr id="20" name="직사각형 19"/>
+          <p:cNvSpPr/>
+          <p:nvPr/>
+        </p:nvSpPr>
+        <p:spPr>
+          <a:xfrm>
+            <a:off x="2625634" y="5466805"/>
+            <a:ext cx="6230983" cy="574766"/>
+          </a:xfrm>
+          <a:prstGeom prst="rect">
+            <a:avLst/>
+          </a:prstGeom>
+        </p:spPr>
+        <p:style>
+          <a:lnRef idx="2">
+            <a:schemeClr val="accent1">
+              <a:shade val="50000"/>
+            </a:schemeClr>
+          </a:lnRef>
+          <a:fillRef idx="1">
+            <a:schemeClr val="accent1"/>
+          </a:fillRef>
+          <a:effectRef idx="0">
+            <a:schemeClr val="accent1"/>
+          </a:effectRef>
+          <a:fontRef idx="minor">
+            <a:schemeClr val="lt1"/>
+          </a:fontRef>
+        </p:style>
+        <p:txBody>
+          <a:bodyPr rtlCol="0" anchor="ctr"/>
+          <a:lstStyle/>
+          <a:p>
+            <a:pPr algn="ctr"/>
+            <a:endParaRPr lang="ko-KR" altLang="en-US"/>
+          </a:p>
+        </p:txBody>
+      </p:sp>
+      <p:sp>
+        <p:nvSpPr>
+          <p:cNvPr id="21" name="직사각형 20"/>
+          <p:cNvSpPr/>
+          <p:nvPr/>
+        </p:nvSpPr>
+        <p:spPr>
+          <a:xfrm>
+            <a:off x="2625634" y="6048100"/>
+            <a:ext cx="6230983" cy="574766"/>
+          </a:xfrm>
+          <a:prstGeom prst="rect">
+            <a:avLst/>
+          </a:prstGeom>
+        </p:spPr>
+        <p:style>
+          <a:lnRef idx="2">
+            <a:schemeClr val="accent1">
+              <a:shade val="50000"/>
+            </a:schemeClr>
+          </a:lnRef>
+          <a:fillRef idx="1">
+            <a:schemeClr val="accent1"/>
+          </a:fillRef>
+          <a:effectRef idx="0">
+            <a:schemeClr val="accent1"/>
+          </a:effectRef>
+          <a:fontRef idx="minor">
+            <a:schemeClr val="lt1"/>
+          </a:fontRef>
+        </p:style>
+        <p:txBody>
+          <a:bodyPr rtlCol="0" anchor="ctr"/>
+          <a:lstStyle/>
+          <a:p>
+            <a:pPr algn="ctr"/>
+            <a:endParaRPr lang="ko-KR" altLang="en-US"/>
+          </a:p>
+        </p:txBody>
+      </p:sp>
+    </p:spTree>
+    <p:extLst>
+      <p:ext uri="{BB962C8B-B14F-4D97-AF65-F5344CB8AC3E}">
+        <p14:creationId xmlns:p14="http://schemas.microsoft.com/office/powerpoint/2010/main" val="3505411548"/>
       </p:ext>
     </p:extLst>
   </p:cSld>

</xml_diff>